<commit_message>
fixed typos in extra backup slide
</commit_message>
<xml_diff>
--- a/work_in_progress/extra_backup_slides.pptx
+++ b/work_in_progress/extra_backup_slides.pptx
@@ -104,6 +104,11 @@
       </a:defRPr>
     </a:lvl9pPr>
   </p:defaultTextStyle>
+  <p:extLst>
+    <p:ext uri="{EFAFB233-063F-42B5-8137-9DF3F51BA10A}">
+      <p15:sldGuideLst xmlns:p15="http://schemas.microsoft.com/office/powerpoint/2012/main"/>
+    </p:ext>
+  </p:extLst>
 </p:presentation>
 </file>
 
@@ -3417,10 +3422,16 @@
               <a:t>The </a:t>
             </a:r>
             <a:r>
+              <a:rPr lang="en-US" b="1" u="sng" dirty="0">
+                <a:latin typeface="Roboto" panose="02000000000000000000" pitchFamily="2" charset="0"/>
+              </a:rPr>
+              <a:t>Expected</a:t>
+            </a:r>
+            <a:r>
               <a:rPr lang="en-US" b="1" dirty="0">
                 <a:latin typeface="Roboto" panose="02000000000000000000" pitchFamily="2" charset="0"/>
               </a:rPr>
-              <a:t>Expected number of exceedances in 100 years is 1</a:t>
+              <a:t> number of exceedances in 100 years is 1</a:t>
             </a:r>
             <a:r>
               <a:rPr lang="en-US" dirty="0">
@@ -3440,7 +3451,34 @@
                 <a:effectLst/>
                 <a:latin typeface="Roboto" panose="02000000000000000000" pitchFamily="2" charset="0"/>
               </a:rPr>
-              <a:t>For example, however, a 100-year event with probability of exceedance in any given year of 1% would have a probability of ~39.5% to be exceeded at least once within 50 years.</a:t>
+              <a:t>For example, however, a 100-year event with probability of exceedance in any given year of 1% would have a probability of ~</a:t>
+            </a:r>
+            <a:r>
+              <a:rPr lang="en-US" dirty="0">
+                <a:latin typeface="Roboto" panose="02000000000000000000" pitchFamily="2" charset="0"/>
+              </a:rPr>
+              <a:t>63.4</a:t>
+            </a:r>
+            <a:r>
+              <a:rPr lang="en-US" b="0" i="0" dirty="0">
+                <a:effectLst/>
+                <a:latin typeface="Roboto" panose="02000000000000000000" pitchFamily="2" charset="0"/>
+              </a:rPr>
+              <a:t>% to be exceeded </a:t>
+            </a:r>
+            <a:r>
+              <a:rPr lang="en-US" b="0" i="0" u="sng" dirty="0">
+                <a:effectLst/>
+                <a:latin typeface="Roboto" panose="02000000000000000000" pitchFamily="2" charset="0"/>
+              </a:rPr>
+              <a:t>at least once</a:t>
+            </a:r>
+            <a:r>
+              <a:rPr lang="en-US" b="0" i="0" dirty="0">
+                <a:effectLst/>
+                <a:latin typeface="Roboto" panose="02000000000000000000" pitchFamily="2" charset="0"/>
+              </a:rPr>
+              <a:t> within 100 years.</a:t>
             </a:r>
           </a:p>
         </p:txBody>
@@ -3670,23 +3708,22 @@
                 </a:pPr>
                 <a:r>
                   <a:rPr lang="en-US" sz="1800" dirty="0"/>
-                  <a:t>where p = prob of exceedance</a:t>
+                  <a:t>where p = prob of exceedance,</a:t>
                 </a:r>
-              </a:p>
-              <a:p>
-                <a:pPr marL="0" indent="0">
-                  <a:buNone/>
-                </a:pPr>
+                <a:br>
+                  <a:rPr lang="en-US" sz="1800" dirty="0"/>
+                </a:br>
                 <a:r>
                   <a:rPr lang="en-US" sz="1800" dirty="0"/>
-                  <a:t>and n = number of time periods (years)</a:t>
+                  <a:t>and n = total # of time periods (years),</a:t>
                 </a:r>
-              </a:p>
-              <a:p>
-                <a:pPr marL="0" indent="0">
-                  <a:buNone/>
-                </a:pPr>
-                <a:endParaRPr lang="en-US" sz="1800" baseline="30000" dirty="0"/>
+                <a:br>
+                  <a:rPr lang="en-US" sz="1800" dirty="0"/>
+                </a:br>
+                <a:r>
+                  <a:rPr lang="en-US" sz="1800" dirty="0"/>
+                  <a:t>and k = # of exceedances (0…n)</a:t>
+                </a:r>
               </a:p>
               <a:p>
                 <a:pPr marL="0" indent="0">
@@ -3705,7 +3742,7 @@
                       <a:rPr lang="en-US" sz="1800" b="0" i="0" dirty="0" smtClean="0">
                         <a:latin typeface="Cambria Math" panose="02040503050406030204" pitchFamily="18" charset="0"/>
                       </a:rPr>
-                      <m:t>X</m:t>
+                      <m:t>Κ</m:t>
                     </m:r>
                     <m:r>
                       <a:rPr lang="en-US" sz="1800" b="0" i="0" smtClean="0">
@@ -3746,13 +3783,11 @@
                 </a14:m>
                 <a:r>
                   <a:rPr lang="en-US" sz="1800" dirty="0"/>
-                  <a:t>,</a:t>
+                  <a:t>, </a:t>
                 </a:r>
-              </a:p>
-              <a:p>
-                <a:pPr marL="0" indent="0">
-                  <a:buNone/>
-                </a:pPr>
+                <a:br>
+                  <a:rPr lang="en-US" sz="1800" dirty="0"/>
+                </a:br>
                 <a:r>
                   <a:rPr lang="en-US" sz="1800" dirty="0"/>
                   <a:t>then </a:t>
@@ -3775,10 +3810,10 @@
                       </m:dPr>
                       <m:e>
                         <m:r>
-                          <a:rPr lang="en-US" sz="1800" b="1" i="1" smtClean="0">
+                          <a:rPr lang="en-US" sz="1800" b="1" i="0" smtClean="0">
                             <a:latin typeface="Cambria Math" panose="02040503050406030204" pitchFamily="18" charset="0"/>
                           </a:rPr>
-                          <m:t>𝑿</m:t>
+                          <m:t>𝚱</m:t>
                         </m:r>
                       </m:e>
                     </m:d>
@@ -3972,19 +4007,7 @@
                             <a:rPr lang="en-US" sz="1800" b="0" i="1" smtClean="0">
                               <a:latin typeface="Cambria Math" panose="02040503050406030204" pitchFamily="18" charset="0"/>
                             </a:rPr>
-                            <m:t>(1−</m:t>
-                          </m:r>
-                          <m:r>
-                            <a:rPr lang="en-US" sz="1800" b="0" i="1" smtClean="0">
-                              <a:latin typeface="Cambria Math" panose="02040503050406030204" pitchFamily="18" charset="0"/>
-                            </a:rPr>
-                            <m:t>0.01</m:t>
-                          </m:r>
-                          <m:r>
-                            <a:rPr lang="en-US" sz="1800" b="0" i="1" smtClean="0">
-                              <a:latin typeface="Cambria Math" panose="02040503050406030204" pitchFamily="18" charset="0"/>
-                            </a:rPr>
-                            <m:t>)</m:t>
+                            <m:t>(1−0.01)</m:t>
                           </m:r>
                         </m:e>
                         <m:sup>
@@ -3992,19 +4015,7 @@
                             <a:rPr lang="en-US" sz="1800" b="0" i="1" smtClean="0">
                               <a:latin typeface="Cambria Math" panose="02040503050406030204" pitchFamily="18" charset="0"/>
                             </a:rPr>
-                            <m:t>100</m:t>
-                          </m:r>
-                          <m:r>
-                            <a:rPr lang="en-US" sz="1800" b="0" i="1" smtClean="0">
-                              <a:latin typeface="Cambria Math" panose="02040503050406030204" pitchFamily="18" charset="0"/>
-                            </a:rPr>
-                            <m:t>−</m:t>
-                          </m:r>
-                          <m:r>
-                            <a:rPr lang="en-US" sz="1800" b="0" i="1" smtClean="0">
-                              <a:latin typeface="Cambria Math" panose="02040503050406030204" pitchFamily="18" charset="0"/>
-                            </a:rPr>
-                            <m:t>0</m:t>
+                            <m:t>100−0</m:t>
                           </m:r>
                         </m:sup>
                       </m:sSup>
@@ -4024,14 +4035,7 @@
                 </a:r>
                 <a:r>
                   <a:rPr lang="en-US" sz="1800" dirty="0"/>
-                  <a:t> </a:t>
-                </a:r>
-                <a:br>
-                  <a:rPr lang="en-US" sz="1800" dirty="0"/>
-                </a:br>
-                <a:r>
-                  <a:rPr lang="en-US" sz="1800" dirty="0"/>
-                  <a:t>= 63.4%</a:t>
+                  <a:t> = 63.4%</a:t>
                 </a:r>
               </a:p>
             </p:txBody>
@@ -4062,7 +4066,7 @@
               <a:blipFill>
                 <a:blip r:embed="rId2"/>
                 <a:stretch>
-                  <a:fillRect l="-1227" t="-1084" b="-813"/>
+                  <a:fillRect l="-1227" t="-1084"/>
                 </a:stretch>
               </a:blipFill>
             </p:spPr>

</xml_diff>